<commit_message>
WholeTranscriptome - ONT summary statistics
Whole Transcriptome - ONT summary statistics and plots, ERCC for Iso-Seq, Iso-Seq vs RNA-Seq

ONT - edits to the bioinformatics pipeline and lab pipeline
</commit_message>
<xml_diff>
--- a/Whole_Transcriptome/Pictures/Pipeline.pptx
+++ b/Whole_Transcriptome/Pictures/Pipeline.pptx
@@ -8,6 +8,8 @@
     <p:sldId id="277" r:id="rId2"/>
     <p:sldId id="279" r:id="rId3"/>
     <p:sldId id="280" r:id="rId4"/>
+    <p:sldId id="281" r:id="rId5"/>
+    <p:sldId id="282" r:id="rId6"/>
   </p:sldIdLst>
   <p:sldSz cx="12192000" cy="18000663"/>
   <p:notesSz cx="6858000" cy="9144000"/>
@@ -245,7 +247,7 @@
           <a:p>
             <a:fld id="{B26E4EDF-85BF-4785-AF96-8A7947630A90}" type="datetimeFigureOut">
               <a:rPr lang="en-GB" smtClean="0"/>
-              <a:t>09/04/2021</a:t>
+              <a:t>30/04/2021</a:t>
             </a:fld>
             <a:endParaRPr lang="en-GB"/>
           </a:p>
@@ -415,7 +417,7 @@
           <a:p>
             <a:fld id="{B26E4EDF-85BF-4785-AF96-8A7947630A90}" type="datetimeFigureOut">
               <a:rPr lang="en-GB" smtClean="0"/>
-              <a:t>09/04/2021</a:t>
+              <a:t>30/04/2021</a:t>
             </a:fld>
             <a:endParaRPr lang="en-GB"/>
           </a:p>
@@ -595,7 +597,7 @@
           <a:p>
             <a:fld id="{B26E4EDF-85BF-4785-AF96-8A7947630A90}" type="datetimeFigureOut">
               <a:rPr lang="en-GB" smtClean="0"/>
-              <a:t>09/04/2021</a:t>
+              <a:t>30/04/2021</a:t>
             </a:fld>
             <a:endParaRPr lang="en-GB"/>
           </a:p>
@@ -765,7 +767,7 @@
           <a:p>
             <a:fld id="{B26E4EDF-85BF-4785-AF96-8A7947630A90}" type="datetimeFigureOut">
               <a:rPr lang="en-GB" smtClean="0"/>
-              <a:t>09/04/2021</a:t>
+              <a:t>30/04/2021</a:t>
             </a:fld>
             <a:endParaRPr lang="en-GB"/>
           </a:p>
@@ -1009,7 +1011,7 @@
           <a:p>
             <a:fld id="{B26E4EDF-85BF-4785-AF96-8A7947630A90}" type="datetimeFigureOut">
               <a:rPr lang="en-GB" smtClean="0"/>
-              <a:t>09/04/2021</a:t>
+              <a:t>30/04/2021</a:t>
             </a:fld>
             <a:endParaRPr lang="en-GB"/>
           </a:p>
@@ -1241,7 +1243,7 @@
           <a:p>
             <a:fld id="{B26E4EDF-85BF-4785-AF96-8A7947630A90}" type="datetimeFigureOut">
               <a:rPr lang="en-GB" smtClean="0"/>
-              <a:t>09/04/2021</a:t>
+              <a:t>30/04/2021</a:t>
             </a:fld>
             <a:endParaRPr lang="en-GB"/>
           </a:p>
@@ -1608,7 +1610,7 @@
           <a:p>
             <a:fld id="{B26E4EDF-85BF-4785-AF96-8A7947630A90}" type="datetimeFigureOut">
               <a:rPr lang="en-GB" smtClean="0"/>
-              <a:t>09/04/2021</a:t>
+              <a:t>30/04/2021</a:t>
             </a:fld>
             <a:endParaRPr lang="en-GB"/>
           </a:p>
@@ -1726,7 +1728,7 @@
           <a:p>
             <a:fld id="{B26E4EDF-85BF-4785-AF96-8A7947630A90}" type="datetimeFigureOut">
               <a:rPr lang="en-GB" smtClean="0"/>
-              <a:t>09/04/2021</a:t>
+              <a:t>30/04/2021</a:t>
             </a:fld>
             <a:endParaRPr lang="en-GB"/>
           </a:p>
@@ -1821,7 +1823,7 @@
           <a:p>
             <a:fld id="{B26E4EDF-85BF-4785-AF96-8A7947630A90}" type="datetimeFigureOut">
               <a:rPr lang="en-GB" smtClean="0"/>
-              <a:t>09/04/2021</a:t>
+              <a:t>30/04/2021</a:t>
             </a:fld>
             <a:endParaRPr lang="en-GB"/>
           </a:p>
@@ -2098,7 +2100,7 @@
           <a:p>
             <a:fld id="{B26E4EDF-85BF-4785-AF96-8A7947630A90}" type="datetimeFigureOut">
               <a:rPr lang="en-GB" smtClean="0"/>
-              <a:t>09/04/2021</a:t>
+              <a:t>30/04/2021</a:t>
             </a:fld>
             <a:endParaRPr lang="en-GB"/>
           </a:p>
@@ -2355,7 +2357,7 @@
           <a:p>
             <a:fld id="{B26E4EDF-85BF-4785-AF96-8A7947630A90}" type="datetimeFigureOut">
               <a:rPr lang="en-GB" smtClean="0"/>
-              <a:t>09/04/2021</a:t>
+              <a:t>30/04/2021</a:t>
             </a:fld>
             <a:endParaRPr lang="en-GB"/>
           </a:p>
@@ -2568,7 +2570,7 @@
           <a:p>
             <a:fld id="{B26E4EDF-85BF-4785-AF96-8A7947630A90}" type="datetimeFigureOut">
               <a:rPr lang="en-GB" smtClean="0"/>
-              <a:t>09/04/2021</a:t>
+              <a:t>30/04/2021</a:t>
             </a:fld>
             <a:endParaRPr lang="en-GB"/>
           </a:p>
@@ -6415,10 +6417,6 @@
               </a:rPr>
               <a:t>c</a:t>
             </a:r>
-            <a:endParaRPr lang="en-GB" sz="3000" dirty="0">
-              <a:latin typeface="Latin Modern Math" panose="02000503000000000000" pitchFamily="50" charset="0"/>
-              <a:ea typeface="Latin Modern Math" panose="02000503000000000000" pitchFamily="50" charset="0"/>
-            </a:endParaRPr>
           </a:p>
         </p:txBody>
       </p:sp>
@@ -6487,10 +6485,6 @@
               </a:rPr>
               <a:t>e</a:t>
             </a:r>
-            <a:endParaRPr lang="en-GB" sz="3000" dirty="0">
-              <a:latin typeface="Latin Modern Math" panose="02000503000000000000" pitchFamily="50" charset="0"/>
-              <a:ea typeface="Latin Modern Math" panose="02000503000000000000" pitchFamily="50" charset="0"/>
-            </a:endParaRPr>
           </a:p>
         </p:txBody>
       </p:sp>
@@ -7082,6 +7076,568 @@
     <p:extLst>
       <p:ext uri="{BB962C8B-B14F-4D97-AF65-F5344CB8AC3E}">
         <p14:creationId xmlns:p14="http://schemas.microsoft.com/office/powerpoint/2010/main" val="363668637"/>
+      </p:ext>
+    </p:extLst>
+  </p:cSld>
+  <p:clrMapOvr>
+    <a:masterClrMapping/>
+  </p:clrMapOvr>
+</p:sld>
+</file>
+
+<file path=ppt/slides/slide4.xml><?xml version="1.0" encoding="utf-8"?>
+<p:sld xmlns:a="http://schemas.openxmlformats.org/drawingml/2006/main" xmlns:r="http://schemas.openxmlformats.org/officeDocument/2006/relationships" xmlns:p="http://schemas.openxmlformats.org/presentationml/2006/main">
+  <p:cSld>
+    <p:spTree>
+      <p:nvGrpSpPr>
+        <p:cNvPr id="1" name=""/>
+        <p:cNvGrpSpPr/>
+        <p:nvPr/>
+      </p:nvGrpSpPr>
+      <p:grpSpPr>
+        <a:xfrm>
+          <a:off x="0" y="0"/>
+          <a:ext cx="0" cy="0"/>
+          <a:chOff x="0" y="0"/>
+          <a:chExt cx="0" cy="0"/>
+        </a:xfrm>
+      </p:grpSpPr>
+      <p:pic>
+        <p:nvPicPr>
+          <p:cNvPr id="4" name="Picture 3"/>
+          <p:cNvPicPr>
+            <a:picLocks noChangeAspect="1"/>
+          </p:cNvPicPr>
+          <p:nvPr/>
+        </p:nvPicPr>
+        <p:blipFill rotWithShape="1">
+          <a:blip r:embed="rId2"/>
+          <a:srcRect l="11798"/>
+          <a:stretch/>
+        </p:blipFill>
+        <p:spPr>
+          <a:xfrm>
+            <a:off x="653326" y="1528245"/>
+            <a:ext cx="10743221" cy="4840344"/>
+          </a:xfrm>
+          <a:prstGeom prst="rect">
+            <a:avLst/>
+          </a:prstGeom>
+        </p:spPr>
+      </p:pic>
+      <p:pic>
+        <p:nvPicPr>
+          <p:cNvPr id="6" name="Picture 5"/>
+          <p:cNvPicPr>
+            <a:picLocks noChangeAspect="1"/>
+          </p:cNvPicPr>
+          <p:nvPr/>
+        </p:nvPicPr>
+        <p:blipFill rotWithShape="1">
+          <a:blip r:embed="rId3"/>
+          <a:srcRect l="10280"/>
+          <a:stretch/>
+        </p:blipFill>
+        <p:spPr>
+          <a:xfrm>
+            <a:off x="653326" y="6689979"/>
+            <a:ext cx="10900045" cy="5096810"/>
+          </a:xfrm>
+          <a:prstGeom prst="rect">
+            <a:avLst/>
+          </a:prstGeom>
+        </p:spPr>
+      </p:pic>
+      <p:sp>
+        <p:nvSpPr>
+          <p:cNvPr id="8" name="TextBox 7"/>
+          <p:cNvSpPr txBox="1"/>
+          <p:nvPr/>
+        </p:nvSpPr>
+        <p:spPr>
+          <a:xfrm>
+            <a:off x="524560" y="992489"/>
+            <a:ext cx="3283393" cy="553998"/>
+          </a:xfrm>
+          <a:prstGeom prst="rect">
+            <a:avLst/>
+          </a:prstGeom>
+          <a:noFill/>
+        </p:spPr>
+        <p:txBody>
+          <a:bodyPr wrap="square" rtlCol="0">
+            <a:spAutoFit/>
+          </a:bodyPr>
+          <a:lstStyle/>
+          <a:p>
+            <a:r>
+              <a:rPr lang="en-GB" sz="3000" dirty="0" smtClean="0">
+                <a:latin typeface="Latin Modern Math" panose="02000503000000000000" pitchFamily="50" charset="0"/>
+                <a:ea typeface="Latin Modern Math" panose="02000503000000000000" pitchFamily="50" charset="0"/>
+              </a:rPr>
+              <a:t>a</a:t>
+            </a:r>
+            <a:endParaRPr lang="en-GB" sz="3000" dirty="0">
+              <a:latin typeface="Latin Modern Math" panose="02000503000000000000" pitchFamily="50" charset="0"/>
+              <a:ea typeface="Latin Modern Math" panose="02000503000000000000" pitchFamily="50" charset="0"/>
+            </a:endParaRPr>
+          </a:p>
+        </p:txBody>
+      </p:sp>
+      <p:sp>
+        <p:nvSpPr>
+          <p:cNvPr id="9" name="TextBox 8"/>
+          <p:cNvSpPr txBox="1"/>
+          <p:nvPr/>
+        </p:nvSpPr>
+        <p:spPr>
+          <a:xfrm>
+            <a:off x="524560" y="6368589"/>
+            <a:ext cx="3283393" cy="553998"/>
+          </a:xfrm>
+          <a:prstGeom prst="rect">
+            <a:avLst/>
+          </a:prstGeom>
+          <a:noFill/>
+        </p:spPr>
+        <p:txBody>
+          <a:bodyPr wrap="square" rtlCol="0">
+            <a:spAutoFit/>
+          </a:bodyPr>
+          <a:lstStyle/>
+          <a:p>
+            <a:r>
+              <a:rPr lang="en-GB" sz="3000" dirty="0" smtClean="0">
+                <a:latin typeface="Latin Modern Math" panose="02000503000000000000" pitchFamily="50" charset="0"/>
+                <a:ea typeface="Latin Modern Math" panose="02000503000000000000" pitchFamily="50" charset="0"/>
+              </a:rPr>
+              <a:t>b</a:t>
+            </a:r>
+            <a:endParaRPr lang="en-GB" sz="3000" dirty="0">
+              <a:latin typeface="Latin Modern Math" panose="02000503000000000000" pitchFamily="50" charset="0"/>
+              <a:ea typeface="Latin Modern Math" panose="02000503000000000000" pitchFamily="50" charset="0"/>
+            </a:endParaRPr>
+          </a:p>
+        </p:txBody>
+      </p:sp>
+      <p:pic>
+        <p:nvPicPr>
+          <p:cNvPr id="10" name="Picture 9"/>
+          <p:cNvPicPr>
+            <a:picLocks noChangeAspect="1"/>
+          </p:cNvPicPr>
+          <p:nvPr/>
+        </p:nvPicPr>
+        <p:blipFill rotWithShape="1">
+          <a:blip r:embed="rId3"/>
+          <a:srcRect l="1316" t="11088" r="89213" b="81877"/>
+          <a:stretch/>
+        </p:blipFill>
+        <p:spPr>
+          <a:xfrm>
+            <a:off x="9796347" y="953487"/>
+            <a:ext cx="1328853" cy="414063"/>
+          </a:xfrm>
+          <a:prstGeom prst="rect">
+            <a:avLst/>
+          </a:prstGeom>
+        </p:spPr>
+      </p:pic>
+    </p:spTree>
+    <p:extLst>
+      <p:ext uri="{BB962C8B-B14F-4D97-AF65-F5344CB8AC3E}">
+        <p14:creationId xmlns:p14="http://schemas.microsoft.com/office/powerpoint/2010/main" val="2187689309"/>
+      </p:ext>
+    </p:extLst>
+  </p:cSld>
+  <p:clrMapOvr>
+    <a:masterClrMapping/>
+  </p:clrMapOvr>
+</p:sld>
+</file>
+
+<file path=ppt/slides/slide5.xml><?xml version="1.0" encoding="utf-8"?>
+<p:sld xmlns:a="http://schemas.openxmlformats.org/drawingml/2006/main" xmlns:r="http://schemas.openxmlformats.org/officeDocument/2006/relationships" xmlns:p="http://schemas.openxmlformats.org/presentationml/2006/main">
+  <p:cSld>
+    <p:spTree>
+      <p:nvGrpSpPr>
+        <p:cNvPr id="1" name=""/>
+        <p:cNvGrpSpPr/>
+        <p:nvPr/>
+      </p:nvGrpSpPr>
+      <p:grpSpPr>
+        <a:xfrm>
+          <a:off x="0" y="0"/>
+          <a:ext cx="0" cy="0"/>
+          <a:chOff x="0" y="0"/>
+          <a:chExt cx="0" cy="0"/>
+        </a:xfrm>
+      </p:grpSpPr>
+      <p:grpSp>
+        <p:nvGrpSpPr>
+          <p:cNvPr id="13" name="Group 12"/>
+          <p:cNvGrpSpPr/>
+          <p:nvPr/>
+        </p:nvGrpSpPr>
+        <p:grpSpPr>
+          <a:xfrm>
+            <a:off x="0" y="7313681"/>
+            <a:ext cx="11598291" cy="896093"/>
+            <a:chOff x="125004" y="2717963"/>
+            <a:chExt cx="11598291" cy="896093"/>
+          </a:xfrm>
+        </p:grpSpPr>
+        <p:pic>
+          <p:nvPicPr>
+            <p:cNvPr id="4" name="Picture 3"/>
+            <p:cNvPicPr>
+              <a:picLocks noChangeAspect="1"/>
+            </p:cNvPicPr>
+            <p:nvPr/>
+          </p:nvPicPr>
+          <p:blipFill rotWithShape="1">
+            <a:blip r:embed="rId2"/>
+            <a:srcRect l="12711" r="9007" b="876"/>
+            <a:stretch/>
+          </p:blipFill>
+          <p:spPr>
+            <a:xfrm>
+              <a:off x="1393371" y="2717963"/>
+              <a:ext cx="10329924" cy="896093"/>
+            </a:xfrm>
+            <a:prstGeom prst="rect">
+              <a:avLst/>
+            </a:prstGeom>
+          </p:spPr>
+        </p:pic>
+        <p:pic>
+          <p:nvPicPr>
+            <p:cNvPr id="6" name="Picture 5"/>
+            <p:cNvPicPr>
+              <a:picLocks noChangeAspect="1"/>
+            </p:cNvPicPr>
+            <p:nvPr/>
+          </p:nvPicPr>
+          <p:blipFill rotWithShape="1">
+            <a:blip r:embed="rId2"/>
+            <a:srcRect l="4572" r="88104" b="68761"/>
+            <a:stretch/>
+          </p:blipFill>
+          <p:spPr>
+            <a:xfrm>
+              <a:off x="125004" y="2717964"/>
+              <a:ext cx="966561" cy="282411"/>
+            </a:xfrm>
+            <a:prstGeom prst="rect">
+              <a:avLst/>
+            </a:prstGeom>
+          </p:spPr>
+        </p:pic>
+      </p:grpSp>
+      <p:grpSp>
+        <p:nvGrpSpPr>
+          <p:cNvPr id="12" name="Group 11"/>
+          <p:cNvGrpSpPr/>
+          <p:nvPr/>
+        </p:nvGrpSpPr>
+        <p:grpSpPr>
+          <a:xfrm>
+            <a:off x="0" y="9657614"/>
+            <a:ext cx="11883943" cy="1161897"/>
+            <a:chOff x="141059" y="3976160"/>
+            <a:chExt cx="11883943" cy="1161897"/>
+          </a:xfrm>
+        </p:grpSpPr>
+        <p:pic>
+          <p:nvPicPr>
+            <p:cNvPr id="5" name="Picture 4"/>
+            <p:cNvPicPr>
+              <a:picLocks noChangeAspect="1"/>
+            </p:cNvPicPr>
+            <p:nvPr/>
+          </p:nvPicPr>
+          <p:blipFill rotWithShape="1">
+            <a:blip r:embed="rId3"/>
+            <a:srcRect l="12191" t="-1" r="1670" b="2969"/>
+            <a:stretch/>
+          </p:blipFill>
+          <p:spPr>
+            <a:xfrm>
+              <a:off x="1091664" y="3976160"/>
+              <a:ext cx="10933338" cy="1053040"/>
+            </a:xfrm>
+            <a:prstGeom prst="rect">
+              <a:avLst/>
+            </a:prstGeom>
+          </p:spPr>
+        </p:pic>
+        <p:pic>
+          <p:nvPicPr>
+            <p:cNvPr id="7" name="Picture 6"/>
+            <p:cNvPicPr>
+              <a:picLocks noChangeAspect="1"/>
+            </p:cNvPicPr>
+            <p:nvPr/>
+          </p:nvPicPr>
+          <p:blipFill rotWithShape="1">
+            <a:blip r:embed="rId3"/>
+            <a:srcRect l="4447" r="88184" b="78448"/>
+            <a:stretch/>
+          </p:blipFill>
+          <p:spPr>
+            <a:xfrm>
+              <a:off x="141059" y="3995211"/>
+              <a:ext cx="935265" cy="233889"/>
+            </a:xfrm>
+            <a:prstGeom prst="rect">
+              <a:avLst/>
+            </a:prstGeom>
+          </p:spPr>
+        </p:pic>
+        <p:sp>
+          <p:nvSpPr>
+            <p:cNvPr id="10" name="Rectangle 9"/>
+            <p:cNvSpPr/>
+            <p:nvPr/>
+          </p:nvSpPr>
+          <p:spPr>
+            <a:xfrm>
+              <a:off x="2844800" y="4731657"/>
+              <a:ext cx="2351314" cy="406400"/>
+            </a:xfrm>
+            <a:prstGeom prst="rect">
+              <a:avLst/>
+            </a:prstGeom>
+            <a:solidFill>
+              <a:schemeClr val="bg1"/>
+            </a:solidFill>
+            <a:ln>
+              <a:solidFill>
+                <a:schemeClr val="bg1"/>
+              </a:solidFill>
+            </a:ln>
+          </p:spPr>
+          <p:style>
+            <a:lnRef idx="2">
+              <a:schemeClr val="accent1">
+                <a:shade val="50000"/>
+              </a:schemeClr>
+            </a:lnRef>
+            <a:fillRef idx="1">
+              <a:schemeClr val="accent1"/>
+            </a:fillRef>
+            <a:effectRef idx="0">
+              <a:schemeClr val="accent1"/>
+            </a:effectRef>
+            <a:fontRef idx="minor">
+              <a:schemeClr val="lt1"/>
+            </a:fontRef>
+          </p:style>
+          <p:txBody>
+            <a:bodyPr rtlCol="0" anchor="ctr"/>
+            <a:lstStyle/>
+            <a:p>
+              <a:pPr algn="ctr"/>
+              <a:endParaRPr lang="en-GB"/>
+            </a:p>
+          </p:txBody>
+        </p:sp>
+        <p:sp>
+          <p:nvSpPr>
+            <p:cNvPr id="11" name="Rectangle 10"/>
+            <p:cNvSpPr/>
+            <p:nvPr/>
+          </p:nvSpPr>
+          <p:spPr>
+            <a:xfrm>
+              <a:off x="11723295" y="4622800"/>
+              <a:ext cx="301707" cy="406400"/>
+            </a:xfrm>
+            <a:prstGeom prst="rect">
+              <a:avLst/>
+            </a:prstGeom>
+            <a:solidFill>
+              <a:schemeClr val="bg1"/>
+            </a:solidFill>
+            <a:ln>
+              <a:solidFill>
+                <a:schemeClr val="bg1"/>
+              </a:solidFill>
+            </a:ln>
+          </p:spPr>
+          <p:style>
+            <a:lnRef idx="2">
+              <a:schemeClr val="accent1">
+                <a:shade val="50000"/>
+              </a:schemeClr>
+            </a:lnRef>
+            <a:fillRef idx="1">
+              <a:schemeClr val="accent1"/>
+            </a:fillRef>
+            <a:effectRef idx="0">
+              <a:schemeClr val="accent1"/>
+            </a:effectRef>
+            <a:fontRef idx="minor">
+              <a:schemeClr val="lt1"/>
+            </a:fontRef>
+          </p:style>
+          <p:txBody>
+            <a:bodyPr rtlCol="0" anchor="ctr"/>
+            <a:lstStyle/>
+            <a:p>
+              <a:pPr algn="ctr"/>
+              <a:endParaRPr lang="en-GB"/>
+            </a:p>
+          </p:txBody>
+        </p:sp>
+      </p:grpSp>
+      <p:sp>
+        <p:nvSpPr>
+          <p:cNvPr id="14" name="TextBox 13"/>
+          <p:cNvSpPr txBox="1"/>
+          <p:nvPr/>
+        </p:nvSpPr>
+        <p:spPr>
+          <a:xfrm>
+            <a:off x="546863" y="6545796"/>
+            <a:ext cx="3283393" cy="630942"/>
+          </a:xfrm>
+          <a:prstGeom prst="rect">
+            <a:avLst/>
+          </a:prstGeom>
+          <a:noFill/>
+        </p:spPr>
+        <p:txBody>
+          <a:bodyPr wrap="square" rtlCol="0">
+            <a:spAutoFit/>
+          </a:bodyPr>
+          <a:lstStyle/>
+          <a:p>
+            <a:r>
+              <a:rPr lang="en-GB" sz="3500" dirty="0" smtClean="0">
+                <a:latin typeface="Latin Modern Math" panose="02000503000000000000" pitchFamily="50" charset="0"/>
+                <a:ea typeface="Latin Modern Math" panose="02000503000000000000" pitchFamily="50" charset="0"/>
+              </a:rPr>
+              <a:t>c</a:t>
+            </a:r>
+            <a:endParaRPr lang="en-GB" sz="3500" dirty="0">
+              <a:latin typeface="Latin Modern Math" panose="02000503000000000000" pitchFamily="50" charset="0"/>
+              <a:ea typeface="Latin Modern Math" panose="02000503000000000000" pitchFamily="50" charset="0"/>
+            </a:endParaRPr>
+          </a:p>
+        </p:txBody>
+      </p:sp>
+      <p:sp>
+        <p:nvSpPr>
+          <p:cNvPr id="15" name="TextBox 14"/>
+          <p:cNvSpPr txBox="1"/>
+          <p:nvPr/>
+        </p:nvSpPr>
+        <p:spPr>
+          <a:xfrm>
+            <a:off x="475188" y="9002867"/>
+            <a:ext cx="3283393" cy="630942"/>
+          </a:xfrm>
+          <a:prstGeom prst="rect">
+            <a:avLst/>
+          </a:prstGeom>
+          <a:noFill/>
+        </p:spPr>
+        <p:txBody>
+          <a:bodyPr wrap="square" rtlCol="0">
+            <a:spAutoFit/>
+          </a:bodyPr>
+          <a:lstStyle/>
+          <a:p>
+            <a:r>
+              <a:rPr lang="en-GB" sz="3500" dirty="0">
+                <a:latin typeface="Latin Modern Math" panose="02000503000000000000" pitchFamily="50" charset="0"/>
+                <a:ea typeface="Latin Modern Math" panose="02000503000000000000" pitchFamily="50" charset="0"/>
+              </a:rPr>
+              <a:t>d</a:t>
+            </a:r>
+            <a:endParaRPr lang="en-GB" sz="3500" dirty="0">
+              <a:latin typeface="Latin Modern Math" panose="02000503000000000000" pitchFamily="50" charset="0"/>
+              <a:ea typeface="Latin Modern Math" panose="02000503000000000000" pitchFamily="50" charset="0"/>
+            </a:endParaRPr>
+          </a:p>
+        </p:txBody>
+      </p:sp>
+      <p:pic>
+        <p:nvPicPr>
+          <p:cNvPr id="16" name="Picture 15"/>
+          <p:cNvPicPr>
+            <a:picLocks noChangeAspect="1"/>
+          </p:cNvPicPr>
+          <p:nvPr/>
+        </p:nvPicPr>
+        <p:blipFill rotWithShape="1">
+          <a:blip r:embed="rId4"/>
+          <a:srcRect t="1639"/>
+          <a:stretch/>
+        </p:blipFill>
+        <p:spPr>
+          <a:xfrm>
+            <a:off x="546862" y="1137423"/>
+            <a:ext cx="10544923" cy="5140744"/>
+          </a:xfrm>
+          <a:prstGeom prst="rect">
+            <a:avLst/>
+          </a:prstGeom>
+        </p:spPr>
+      </p:pic>
+      <p:sp>
+        <p:nvSpPr>
+          <p:cNvPr id="17" name="Rectangle 16"/>
+          <p:cNvSpPr/>
+          <p:nvPr/>
+        </p:nvSpPr>
+        <p:spPr>
+          <a:xfrm>
+            <a:off x="1268367" y="7596093"/>
+            <a:ext cx="560433" cy="256136"/>
+          </a:xfrm>
+          <a:prstGeom prst="rect">
+            <a:avLst/>
+          </a:prstGeom>
+          <a:solidFill>
+            <a:schemeClr val="bg1"/>
+          </a:solidFill>
+          <a:ln>
+            <a:solidFill>
+              <a:schemeClr val="bg1"/>
+            </a:solidFill>
+          </a:ln>
+        </p:spPr>
+        <p:style>
+          <a:lnRef idx="2">
+            <a:schemeClr val="accent1">
+              <a:shade val="50000"/>
+            </a:schemeClr>
+          </a:lnRef>
+          <a:fillRef idx="1">
+            <a:schemeClr val="accent1"/>
+          </a:fillRef>
+          <a:effectRef idx="0">
+            <a:schemeClr val="accent1"/>
+          </a:effectRef>
+          <a:fontRef idx="minor">
+            <a:schemeClr val="lt1"/>
+          </a:fontRef>
+        </p:style>
+        <p:txBody>
+          <a:bodyPr rtlCol="0" anchor="ctr"/>
+          <a:lstStyle/>
+          <a:p>
+            <a:pPr algn="ctr"/>
+            <a:endParaRPr lang="en-GB"/>
+          </a:p>
+        </p:txBody>
+      </p:sp>
+    </p:spTree>
+    <p:extLst>
+      <p:ext uri="{BB962C8B-B14F-4D97-AF65-F5344CB8AC3E}">
+        <p14:creationId xmlns:p14="http://schemas.microsoft.com/office/powerpoint/2010/main" val="2508395053"/>
       </p:ext>
     </p:extLst>
   </p:cSld>

</xml_diff>